<commit_message>
Updated presentation materials - Revised PowerPoint deck - Replaced flight phase chart with improved heatmap visualization - Added PDF export of slides
</commit_message>
<xml_diff>
--- a/Powerpoint Presentation.pptx
+++ b/Powerpoint Presentation.pptx
@@ -5697,6 +5697,14 @@
 <file path=ppt/slides/slide1.xml><?xml version="1.0" encoding="utf-8"?>
 <p:sld xmlns:a="http://schemas.openxmlformats.org/drawingml/2006/main" xmlns:r="http://schemas.openxmlformats.org/officeDocument/2006/relationships" xmlns:p="http://schemas.openxmlformats.org/presentationml/2006/main">
   <p:cSld>
+    <p:bg>
+      <p:bgPr>
+        <a:solidFill>
+          <a:schemeClr val="tx2"/>
+        </a:solidFill>
+        <a:effectLst/>
+      </p:bgPr>
+    </p:bg>
     <p:spTree>
       <p:nvGrpSpPr>
         <p:cNvPr id="1" name=""/>
@@ -5834,31 +5842,6 @@
           </a:p>
         </p:txBody>
       </p:sp>
-      <p:pic>
-        <p:nvPicPr>
-          <p:cNvPr id="9" name="Content Placeholder 8" descr="A graph of different types of flight&#10;&#10;Description automatically generated"/>
-          <p:cNvPicPr>
-            <a:picLocks noGrp="1" noChangeAspect="1"/>
-          </p:cNvPicPr>
-          <p:nvPr>
-            <p:ph sz="half" idx="15"/>
-          </p:nvPr>
-        </p:nvPicPr>
-        <p:blipFill>
-          <a:blip r:embed="rId1"/>
-          <a:srcRect l="23501" r="14213" b="-2"/>
-          <a:stretch>
-            <a:fillRect/>
-          </a:stretch>
-        </p:blipFill>
-        <p:spPr>
-          <a:xfrm>
-            <a:off x="545990" y="1135799"/>
-            <a:ext cx="6779149" cy="5222981"/>
-          </a:xfrm>
-          <a:noFill/>
-        </p:spPr>
-      </p:pic>
       <p:sp>
         <p:nvSpPr>
           <p:cNvPr id="4" name="Content Placeholder 3"/>
@@ -5871,8 +5854,8 @@
         </p:nvSpPr>
         <p:spPr>
           <a:xfrm>
-            <a:off x="7007456" y="726188"/>
-            <a:ext cx="4489174" cy="5568468"/>
+            <a:off x="7591425" y="726440"/>
+            <a:ext cx="4600575" cy="5568315"/>
           </a:xfrm>
         </p:spPr>
         <p:txBody>
@@ -5944,6 +5927,32 @@
           </a:p>
         </p:txBody>
       </p:sp>
+      <p:pic>
+        <p:nvPicPr>
+          <p:cNvPr id="5" name="Content Placeholder 4" descr="Heatmap of Aircraft Incidents by Broad.phase.of.flight and Damage Type"/>
+          <p:cNvPicPr>
+            <a:picLocks noChangeAspect="1"/>
+          </p:cNvPicPr>
+          <p:nvPr>
+            <p:ph sz="half" idx="15"/>
+          </p:nvPr>
+        </p:nvPicPr>
+        <p:blipFill>
+          <a:blip r:embed="rId1"/>
+          <a:stretch>
+            <a:fillRect/>
+          </a:stretch>
+        </p:blipFill>
+        <p:spPr>
+          <a:xfrm>
+            <a:off x="-685800" y="726440"/>
+            <a:ext cx="8277225" cy="5132705"/>
+          </a:xfrm>
+          <a:prstGeom prst="rect">
+            <a:avLst/>
+          </a:prstGeom>
+        </p:spPr>
+      </p:pic>
     </p:spTree>
   </p:cSld>
   <p:clrMapOvr>
@@ -6276,6 +6285,14 @@
 <file path=ppt/slides/slide13.xml><?xml version="1.0" encoding="utf-8"?>
 <p:sld xmlns:a="http://schemas.openxmlformats.org/drawingml/2006/main" xmlns:r="http://schemas.openxmlformats.org/officeDocument/2006/relationships" xmlns:p="http://schemas.openxmlformats.org/presentationml/2006/main">
   <p:cSld>
+    <p:bg>
+      <p:bgPr>
+        <a:solidFill>
+          <a:schemeClr val="tx2"/>
+        </a:solidFill>
+        <a:effectLst/>
+      </p:bgPr>
+    </p:bg>
     <p:spTree>
       <p:nvGrpSpPr>
         <p:cNvPr id="1" name=""/>
@@ -6342,6 +6359,14 @@
 <file path=ppt/slides/slide14.xml><?xml version="1.0" encoding="utf-8"?>
 <p:sld xmlns:a="http://schemas.openxmlformats.org/drawingml/2006/main" xmlns:r="http://schemas.openxmlformats.org/officeDocument/2006/relationships" xmlns:p="http://schemas.openxmlformats.org/presentationml/2006/main">
   <p:cSld>
+    <p:bg>
+      <p:bgPr>
+        <a:solidFill>
+          <a:schemeClr val="tx2"/>
+        </a:solidFill>
+        <a:effectLst/>
+      </p:bgPr>
+    </p:bg>
     <p:spTree>
       <p:nvGrpSpPr>
         <p:cNvPr id="1" name=""/>
@@ -6397,6 +6422,14 @@
 <file path=ppt/slides/slide15.xml><?xml version="1.0" encoding="utf-8"?>
 <p:sld xmlns:a="http://schemas.openxmlformats.org/drawingml/2006/main" xmlns:r="http://schemas.openxmlformats.org/officeDocument/2006/relationships" xmlns:p="http://schemas.openxmlformats.org/presentationml/2006/main">
   <p:cSld>
+    <p:bg>
+      <p:bgPr>
+        <a:solidFill>
+          <a:schemeClr val="tx2"/>
+        </a:solidFill>
+        <a:effectLst/>
+      </p:bgPr>
+    </p:bg>
     <p:spTree>
       <p:nvGrpSpPr>
         <p:cNvPr id="1" name=""/>
@@ -6849,6 +6882,14 @@
 <file path=ppt/slides/slide16.xml><?xml version="1.0" encoding="utf-8"?>
 <p:sld xmlns:a="http://schemas.openxmlformats.org/drawingml/2006/main" xmlns:r="http://schemas.openxmlformats.org/officeDocument/2006/relationships" xmlns:p="http://schemas.openxmlformats.org/presentationml/2006/main">
   <p:cSld>
+    <p:bg>
+      <p:bgPr>
+        <a:solidFill>
+          <a:schemeClr val="tx2"/>
+        </a:solidFill>
+        <a:effectLst/>
+      </p:bgPr>
+    </p:bg>
     <p:spTree>
       <p:nvGrpSpPr>
         <p:cNvPr id="1" name=""/>
@@ -7326,6 +7367,14 @@
 <file path=ppt/slides/slide17.xml><?xml version="1.0" encoding="utf-8"?>
 <p:sld xmlns:a="http://schemas.openxmlformats.org/drawingml/2006/main" xmlns:r="http://schemas.openxmlformats.org/officeDocument/2006/relationships" xmlns:p="http://schemas.openxmlformats.org/presentationml/2006/main">
   <p:cSld>
+    <p:bg>
+      <p:bgPr>
+        <a:solidFill>
+          <a:schemeClr val="tx2"/>
+        </a:solidFill>
+        <a:effectLst/>
+      </p:bgPr>
+    </p:bg>
     <p:spTree>
       <p:nvGrpSpPr>
         <p:cNvPr id="1" name=""/>
@@ -7811,6 +7860,14 @@
 <file path=ppt/slides/slide18.xml><?xml version="1.0" encoding="utf-8"?>
 <p:sld xmlns:a="http://schemas.openxmlformats.org/drawingml/2006/main" xmlns:r="http://schemas.openxmlformats.org/officeDocument/2006/relationships" xmlns:p="http://schemas.openxmlformats.org/presentationml/2006/main">
   <p:cSld>
+    <p:bg>
+      <p:bgPr>
+        <a:solidFill>
+          <a:schemeClr val="tx2"/>
+        </a:solidFill>
+        <a:effectLst/>
+      </p:bgPr>
+    </p:bg>
     <p:spTree>
       <p:nvGrpSpPr>
         <p:cNvPr id="1" name=""/>
@@ -7893,6 +7950,14 @@
 <file path=ppt/slides/slide19.xml><?xml version="1.0" encoding="utf-8"?>
 <p:sld xmlns:a="http://schemas.openxmlformats.org/drawingml/2006/main" xmlns:r="http://schemas.openxmlformats.org/officeDocument/2006/relationships" xmlns:p="http://schemas.openxmlformats.org/presentationml/2006/main">
   <p:cSld>
+    <p:bg>
+      <p:bgPr>
+        <a:solidFill>
+          <a:schemeClr val="tx2"/>
+        </a:solidFill>
+        <a:effectLst/>
+      </p:bgPr>
+    </p:bg>
     <p:spTree>
       <p:nvGrpSpPr>
         <p:cNvPr id="1" name=""/>
@@ -8162,6 +8227,14 @@
 <file path=ppt/slides/slide3.xml><?xml version="1.0" encoding="utf-8"?>
 <p:sld xmlns:a="http://schemas.openxmlformats.org/drawingml/2006/main" xmlns:r="http://schemas.openxmlformats.org/officeDocument/2006/relationships" xmlns:p="http://schemas.openxmlformats.org/presentationml/2006/main">
   <p:cSld>
+    <p:bg>
+      <p:bgPr>
+        <a:solidFill>
+          <a:schemeClr val="tx2"/>
+        </a:solidFill>
+        <a:effectLst/>
+      </p:bgPr>
+    </p:bg>
     <p:spTree>
       <p:nvGrpSpPr>
         <p:cNvPr id="1" name=""/>
@@ -8842,6 +8915,14 @@
 <file path=ppt/slides/slide5.xml><?xml version="1.0" encoding="utf-8"?>
 <p:sld xmlns:a="http://schemas.openxmlformats.org/drawingml/2006/main" xmlns:r="http://schemas.openxmlformats.org/officeDocument/2006/relationships" xmlns:p="http://schemas.openxmlformats.org/presentationml/2006/main">
   <p:cSld>
+    <p:bg>
+      <p:bgPr>
+        <a:solidFill>
+          <a:schemeClr val="tx2"/>
+        </a:solidFill>
+        <a:effectLst/>
+      </p:bgPr>
+    </p:bg>
     <p:spTree>
       <p:nvGrpSpPr>
         <p:cNvPr id="1" name=""/>

</xml_diff>